<commit_message>
commiting with new ppt slides
</commit_message>
<xml_diff>
--- a/src/20251109_roiti_case_study_juan_Fernandez.pptx
+++ b/src/20251109_roiti_case_study_juan_Fernandez.pptx
@@ -7749,7 +7749,7 @@
         </p:blipFill>
         <p:spPr>
           <a:xfrm>
-            <a:off x="1053151" y="225400"/>
+            <a:off x="214179" y="225400"/>
             <a:ext cx="4048690" cy="6230219"/>
           </a:xfrm>
           <a:prstGeom prst="rect">
@@ -7779,8 +7779,38 @@
         </p:blipFill>
         <p:spPr>
           <a:xfrm>
-            <a:off x="5353081" y="3080191"/>
+            <a:off x="4881133" y="1676628"/>
             <a:ext cx="3358300" cy="697618"/>
+          </a:xfrm>
+          <a:prstGeom prst="rect">
+            <a:avLst/>
+          </a:prstGeom>
+        </p:spPr>
+      </p:pic>
+      <p:pic>
+        <p:nvPicPr>
+          <p:cNvPr id="4" name="Picture 3">
+            <a:extLst>
+              <a:ext uri="{FF2B5EF4-FFF2-40B4-BE49-F238E27FC236}">
+                <a16:creationId xmlns:a16="http://schemas.microsoft.com/office/drawing/2014/main" id="{3B0A2C00-5731-F75E-86C7-34FE67724668}"/>
+              </a:ext>
+            </a:extLst>
+          </p:cNvPr>
+          <p:cNvPicPr>
+            <a:picLocks noChangeAspect="1"/>
+          </p:cNvPicPr>
+          <p:nvPr/>
+        </p:nvPicPr>
+        <p:blipFill>
+          <a:blip r:embed="rId4"/>
+          <a:stretch>
+            <a:fillRect/>
+          </a:stretch>
+        </p:blipFill>
+        <p:spPr>
+          <a:xfrm>
+            <a:off x="4572000" y="3089673"/>
+            <a:ext cx="4143953" cy="2762636"/>
           </a:xfrm>
           <a:prstGeom prst="rect">
             <a:avLst/>

</xml_diff>